<commit_message>
Minor changes ppt V2.1
</commit_message>
<xml_diff>
--- a/doc/Cer2016_Femke Thon & Jolien Gay_V2.1.pptx
+++ b/doc/Cer2016_Femke Thon & Jolien Gay_V2.1.pptx
@@ -612,14 +612,6 @@
           </a:bodyPr>
           <a:lstStyle/>
           <a:p>
-            <a:r>
-              <a:rPr lang="nl-NL" dirty="0" smtClean="0"/>
-              <a:t>TODO: Add x</a:t>
-            </a:r>
-            <a:r>
-              <a:rPr lang="nl-NL" baseline="0" dirty="0" smtClean="0"/>
-              <a:t> and y label to picture 2 (nLTT plot)</a:t>
-            </a:r>
             <a:endParaRPr lang="en-GB" dirty="0"/>
           </a:p>
         </p:txBody>
@@ -718,11 +710,7 @@
           <a:p>
             <a:r>
               <a:rPr lang="nl-NL" dirty="0" smtClean="0"/>
-              <a:t>TODO</a:t>
-            </a:r>
-            <a:r>
-              <a:rPr lang="nl-NL" dirty="0" smtClean="0"/>
-              <a:t>:</a:t>
+              <a:t>TODO:</a:t>
             </a:r>
             <a:r>
               <a:rPr lang="nl-NL" baseline="0" dirty="0" smtClean="0"/>
@@ -4126,15 +4114,7 @@
           <a:p>
             <a:r>
               <a:rPr lang="en-GB" sz="5400" dirty="0" smtClean="0"/>
-              <a:t>BEAST2 and </a:t>
-            </a:r>
-            <a:r>
-              <a:rPr lang="en-GB" sz="5400" dirty="0" smtClean="0"/>
-              <a:t>the Protracted </a:t>
-            </a:r>
-            <a:r>
-              <a:rPr lang="en-GB" sz="5400" dirty="0" smtClean="0"/>
-              <a:t>Birth-Death model</a:t>
+              <a:t>BEAST2 and the Protracted Birth-Death model</a:t>
             </a:r>
             <a:endParaRPr lang="en-GB" sz="5400" dirty="0"/>
           </a:p>
@@ -4927,11 +4907,54 @@
             </a:pPr>
             <a:r>
               <a:rPr lang="nl-NL" sz="2400" dirty="0" smtClean="0"/>
-              <a:t>Compare posterior with true species tree (step1</a:t>
+              <a:t>Compare posterior with true species tree </a:t>
             </a:r>
             <a:r>
               <a:rPr lang="nl-NL" sz="2400" dirty="0" smtClean="0"/>
-              <a:t>)</a:t>
+              <a:t>(from step1)</a:t>
+            </a:r>
+          </a:p>
+          <a:p>
+            <a:pPr marL="342900" lvl="0" indent="-342900">
+              <a:spcBef>
+                <a:spcPct val="20000"/>
+              </a:spcBef>
+              <a:buFont typeface="Arial" pitchFamily="34" charset="0"/>
+              <a:buChar char="•"/>
+            </a:pPr>
+            <a:r>
+              <a:rPr kumimoji="0" lang="nl-NL" sz="2400" b="0" i="0" u="none" strike="noStrike" kern="1200" cap="none" spc="0" normalizeH="0" baseline="0" noProof="0" dirty="0" smtClean="0">
+                <a:ln>
+                  <a:noFill/>
+                </a:ln>
+                <a:solidFill>
+                  <a:schemeClr val="tx1"/>
+                </a:solidFill>
+                <a:effectLst/>
+                <a:uLnTx/>
+                <a:uFillTx/>
+                <a:latin typeface="+mn-lt"/>
+                <a:ea typeface="+mn-ea"/>
+                <a:cs typeface="+mn-cs"/>
+              </a:rPr>
+              <a:t>Collect summary</a:t>
+            </a:r>
+            <a:r>
+              <a:rPr kumimoji="0" lang="nl-NL" sz="2400" b="0" i="0" u="none" strike="noStrike" kern="1200" cap="none" spc="0" normalizeH="0" noProof="0" dirty="0" smtClean="0">
+                <a:ln>
+                  <a:noFill/>
+                </a:ln>
+                <a:solidFill>
+                  <a:schemeClr val="tx1"/>
+                </a:solidFill>
+                <a:effectLst/>
+                <a:uLnTx/>
+                <a:uFillTx/>
+                <a:latin typeface="+mn-lt"/>
+                <a:ea typeface="+mn-ea"/>
+                <a:cs typeface="+mn-cs"/>
+              </a:rPr>
+              <a:t> statistics (gamma, ....)</a:t>
             </a:r>
             <a:endParaRPr kumimoji="0" lang="en-GB" sz="2400" b="0" i="0" u="none" strike="noStrike" kern="1200" cap="none" spc="0" normalizeH="0" baseline="0" noProof="0" dirty="0" smtClean="0">
               <a:ln>
@@ -5030,7 +5053,6 @@
               <a:rPr lang="en-GB" sz="2800" dirty="0" smtClean="0"/>
               <a:t>Right summary statistics used?</a:t>
             </a:r>
-            <a:endParaRPr lang="en-GB" sz="2800" dirty="0" smtClean="0"/>
           </a:p>
           <a:p>
             <a:pPr>
@@ -5695,7 +5717,6 @@
               <a:rPr lang="nl-NL" dirty="0" smtClean="0"/>
               <a:t>“Can BEAST2 accurately recover a ‘true’ tree?”</a:t>
             </a:r>
-            <a:endParaRPr lang="nl-NL" dirty="0" smtClean="0"/>
           </a:p>
           <a:p>
             <a:pPr>
@@ -5849,7 +5870,6 @@
               <a:rPr lang="en-GB" sz="2000" dirty="0" smtClean="0"/>
               <a:t>-&gt; Tools needed!</a:t>
             </a:r>
-            <a:endParaRPr lang="en-GB" sz="2000" dirty="0" smtClean="0"/>
           </a:p>
           <a:p>
             <a:pPr lvl="1"/>
@@ -5882,6 +5902,32 @@
           <a:chExt cx="0" cy="0"/>
         </a:xfrm>
       </p:grpSpPr>
+      <p:pic>
+        <p:nvPicPr>
+          <p:cNvPr id="1028" name="Picture 4" descr="C:\Users\Aline\Dropbox\RUG 2015-2016\1.9 Community eclogy research\4. Poster_presentation\Photo's\BayesianApproach.png"/>
+          <p:cNvPicPr>
+            <a:picLocks noChangeAspect="1" noChangeArrowheads="1"/>
+          </p:cNvPicPr>
+          <p:nvPr/>
+        </p:nvPicPr>
+        <p:blipFill>
+          <a:blip r:embed="rId2" cstate="print"/>
+          <a:srcRect/>
+          <a:stretch>
+            <a:fillRect/>
+          </a:stretch>
+        </p:blipFill>
+        <p:spPr bwMode="auto">
+          <a:xfrm>
+            <a:off x="4419600" y="2438400"/>
+            <a:ext cx="4171950" cy="676275"/>
+          </a:xfrm>
+          <a:prstGeom prst="rect">
+            <a:avLst/>
+          </a:prstGeom>
+          <a:noFill/>
+        </p:spPr>
+      </p:pic>
       <p:sp>
         <p:nvSpPr>
           <p:cNvPr id="2" name="Title 1"/>
@@ -5973,11 +6019,33 @@
             </a:r>
           </a:p>
           <a:p>
-            <a:pPr lvl="1"/>
-            <a:r>
-              <a:rPr lang="nl-NL" sz="2400" dirty="0" smtClean="0"/>
-              <a:t>MCMC</a:t>
-            </a:r>
+            <a:pPr lvl="2">
+              <a:buNone/>
+            </a:pPr>
+            <a:r>
+              <a:rPr lang="en-GB" sz="2000" dirty="0" smtClean="0"/>
+              <a:t>Markov Chain Monte </a:t>
+            </a:r>
+            <a:r>
+              <a:rPr lang="en-GB" sz="2000" dirty="0" smtClean="0"/>
+              <a:t>Carlo (</a:t>
+            </a:r>
+            <a:r>
+              <a:rPr lang="nl-NL" sz="2000" dirty="0" smtClean="0"/>
+              <a:t>MCMC)</a:t>
+            </a:r>
+          </a:p>
+          <a:p>
+            <a:pPr lvl="2">
+              <a:buNone/>
+            </a:pPr>
+            <a:endParaRPr lang="nl-NL" sz="2000" dirty="0" smtClean="0"/>
+          </a:p>
+          <a:p>
+            <a:pPr lvl="2">
+              <a:buNone/>
+            </a:pPr>
+            <a:endParaRPr lang="nl-NL" sz="2000" dirty="0" smtClean="0"/>
           </a:p>
           <a:p>
             <a:pPr lvl="1"/>
@@ -6083,18 +6151,40 @@
             <a:pPr lvl="1"/>
             <a:r>
               <a:rPr lang="nl-NL" sz="2400" dirty="0" smtClean="0"/>
-              <a:t>Constant speciation and extinction rates</a:t>
-            </a:r>
+              <a:t>Instant </a:t>
+            </a:r>
+            <a:r>
+              <a:rPr lang="nl-NL" sz="2400" dirty="0" smtClean="0"/>
+              <a:t>speciation</a:t>
+            </a:r>
+            <a:endParaRPr lang="nl-NL" sz="2400" dirty="0" smtClean="0"/>
           </a:p>
           <a:p>
             <a:pPr lvl="1"/>
             <a:r>
               <a:rPr lang="nl-NL" sz="2400" dirty="0" smtClean="0"/>
-              <a:t>Number of lineages increase constant or accelerated (pull of the present)</a:t>
+              <a:t>Constant </a:t>
+            </a:r>
+            <a:r>
+              <a:rPr lang="nl-NL" sz="2400" dirty="0" smtClean="0"/>
+              <a:t>speciation and extinction rates</a:t>
             </a:r>
           </a:p>
           <a:p>
             <a:pPr lvl="1"/>
+            <a:r>
+              <a:rPr lang="nl-NL" sz="2400" dirty="0" smtClean="0"/>
+              <a:t>Number of lineages increase constant or accelerated (pull of the present</a:t>
+            </a:r>
+            <a:r>
+              <a:rPr lang="nl-NL" sz="2400" dirty="0" smtClean="0"/>
+              <a:t>)</a:t>
+            </a:r>
+          </a:p>
+          <a:p>
+            <a:pPr lvl="1">
+              <a:buNone/>
+            </a:pPr>
             <a:endParaRPr lang="nl-NL" sz="2400" dirty="0" smtClean="0"/>
           </a:p>
           <a:p>
@@ -6127,7 +6217,7 @@
             </a:pPr>
             <a:r>
               <a:rPr lang="nl-NL" sz="2800" dirty="0" smtClean="0"/>
-              <a:t>		[picture]</a:t>
+              <a:t>		</a:t>
             </a:r>
             <a:endParaRPr lang="en-GB" sz="2800" dirty="0" smtClean="0"/>
           </a:p>
@@ -6438,13 +6528,8 @@
             <a:pPr lvl="1"/>
             <a:r>
               <a:rPr lang="nl-NL" sz="2400" dirty="0" smtClean="0"/>
-              <a:t>Simulated PBD </a:t>
-            </a:r>
-            <a:r>
-              <a:rPr lang="nl-NL" sz="2400" dirty="0" smtClean="0"/>
-              <a:t>parameter files</a:t>
-            </a:r>
-            <a:endParaRPr lang="nl-NL" sz="2400" dirty="0" smtClean="0"/>
+              <a:t>Simulated PBD parameter files</a:t>
+            </a:r>
           </a:p>
           <a:p>
             <a:pPr lvl="1"/>

</xml_diff>

<commit_message>
made lintr bot happy
</commit_message>
<xml_diff>
--- a/doc/Cer2016_Femke Thon & Jolien Gay_V2.1.pptx
+++ b/doc/Cer2016_Femke Thon & Jolien Gay_V2.1.pptx
@@ -124,6 +124,22 @@
       </a:defRPr>
     </a:lvl9pPr>
   </p:defaultTextStyle>
+  <p:extLst>
+    <p:ext uri="{EFAFB233-063F-42B5-8137-9DF3F51BA10A}">
+      <p15:sldGuideLst xmlns:p15="http://schemas.microsoft.com/office/powerpoint/2012/main">
+        <p15:guide id="1" orient="horz" pos="2160">
+          <p15:clr>
+            <a:srgbClr val="A4A3A4"/>
+          </p15:clr>
+        </p15:guide>
+        <p15:guide id="2" pos="2880">
+          <p15:clr>
+            <a:srgbClr val="A4A3A4"/>
+          </p15:clr>
+        </p15:guide>
+      </p15:sldGuideLst>
+    </p:ext>
+  </p:extLst>
 </p:presentation>
 </file>
 
@@ -210,7 +226,7 @@
             <a:fld id="{31638245-5222-4875-B595-DAA9E1B2F047}" type="datetimeFigureOut">
               <a:rPr lang="en-GB" smtClean="0"/>
               <a:pPr/>
-              <a:t>17/05/2016</a:t>
+              <a:t>18/05/2016</a:t>
             </a:fld>
             <a:endParaRPr lang="en-GB"/>
           </a:p>
@@ -372,13 +388,18 @@
             <a:fld id="{9BBE7A90-5B18-44E6-896F-B56F6E25EE11}" type="slidenum">
               <a:rPr lang="en-GB" smtClean="0"/>
               <a:pPr/>
-              <a:t>‹#›</a:t>
+              <a:t>‹nr.›</a:t>
             </a:fld>
             <a:endParaRPr lang="en-GB"/>
           </a:p>
         </p:txBody>
       </p:sp>
     </p:spTree>
+    <p:extLst>
+      <p:ext uri="{BB962C8B-B14F-4D97-AF65-F5344CB8AC3E}">
+        <p14:creationId xmlns:p14="http://schemas.microsoft.com/office/powerpoint/2010/main" val="1694440880"/>
+      </p:ext>
+    </p:extLst>
   </p:cSld>
   <p:clrMap bg1="lt1" tx1="dk1" bg2="lt2" tx2="dk2" accent1="accent1" accent2="accent2" accent3="accent3" accent4="accent4" accent5="accent5" accent6="accent6" hlink="hlink" folHlink="folHlink"/>
   <p:notesStyle>
@@ -559,6 +580,11 @@
         </p:txBody>
       </p:sp>
     </p:spTree>
+    <p:extLst>
+      <p:ext uri="{BB962C8B-B14F-4D97-AF65-F5344CB8AC3E}">
+        <p14:creationId xmlns:p14="http://schemas.microsoft.com/office/powerpoint/2010/main" val="4164740618"/>
+      </p:ext>
+    </p:extLst>
   </p:cSld>
   <p:clrMapOvr>
     <a:masterClrMapping/>
@@ -585,7 +611,7 @@
       </p:grpSpPr>
       <p:sp>
         <p:nvSpPr>
-          <p:cNvPr id="2" name="Slide Image Placeholder 1"/>
+          <p:cNvPr id="2" name="Tijdelijke aanduiding voor dia-afbeelding 1"/>
           <p:cNvSpPr>
             <a:spLocks noGrp="1" noRot="1" noChangeAspect="1"/>
           </p:cNvSpPr>
@@ -597,7 +623,7 @@
       </p:sp>
       <p:sp>
         <p:nvSpPr>
-          <p:cNvPr id="3" name="Notes Placeholder 2"/>
+          <p:cNvPr id="3" name="Tijdelijke aanduiding voor notities 2"/>
           <p:cNvSpPr>
             <a:spLocks noGrp="1"/>
           </p:cNvSpPr>
@@ -607,18 +633,176 @@
         </p:nvSpPr>
         <p:spPr/>
         <p:txBody>
-          <a:bodyPr>
-            <a:normAutofit/>
-          </a:bodyPr>
-          <a:lstStyle/>
-          <a:p>
+          <a:bodyPr/>
+          <a:lstStyle/>
+          <a:p>
+            <a:r>
+              <a:rPr lang="en-GB" dirty="0" err="1" smtClean="0"/>
+              <a:t>Moeten</a:t>
+            </a:r>
+            <a:r>
+              <a:rPr lang="en-GB" dirty="0" smtClean="0"/>
+              <a:t> we het nog </a:t>
+            </a:r>
+            <a:r>
+              <a:rPr lang="en-GB" dirty="0" err="1" smtClean="0"/>
+              <a:t>eens</a:t>
+            </a:r>
+            <a:r>
+              <a:rPr lang="en-GB" baseline="0" dirty="0" smtClean="0"/>
+              <a:t> </a:t>
+            </a:r>
+            <a:r>
+              <a:rPr lang="en-GB" baseline="0" dirty="0" err="1" smtClean="0"/>
+              <a:t>uitgebreid</a:t>
+            </a:r>
+            <a:r>
+              <a:rPr lang="en-GB" baseline="0" dirty="0" smtClean="0"/>
+              <a:t> over </a:t>
+            </a:r>
+            <a:r>
+              <a:rPr lang="en-GB" baseline="0" dirty="0" err="1" smtClean="0"/>
+              <a:t>hebben</a:t>
+            </a:r>
+            <a:r>
+              <a:rPr lang="en-GB" baseline="0" dirty="0" smtClean="0"/>
+              <a:t>. </a:t>
+            </a:r>
+            <a:r>
+              <a:rPr lang="en-GB" baseline="0" dirty="0" err="1" smtClean="0"/>
+              <a:t>Hier</a:t>
+            </a:r>
+            <a:r>
+              <a:rPr lang="en-GB" baseline="0" dirty="0" smtClean="0"/>
+              <a:t> </a:t>
+            </a:r>
+            <a:r>
+              <a:rPr lang="en-GB" baseline="0" dirty="0" err="1" smtClean="0"/>
+              <a:t>staat</a:t>
+            </a:r>
+            <a:r>
+              <a:rPr lang="en-GB" baseline="0" dirty="0" smtClean="0"/>
+              <a:t> </a:t>
+            </a:r>
+            <a:r>
+              <a:rPr lang="en-GB" baseline="0" dirty="0" err="1" smtClean="0"/>
+              <a:t>vermoedelijk</a:t>
+            </a:r>
+            <a:r>
+              <a:rPr lang="en-GB" baseline="0" dirty="0" smtClean="0"/>
+              <a:t> nog </a:t>
+            </a:r>
+            <a:r>
+              <a:rPr lang="en-GB" baseline="0" dirty="0" err="1" smtClean="0"/>
+              <a:t>een</a:t>
+            </a:r>
+            <a:r>
+              <a:rPr lang="en-GB" baseline="0" dirty="0" smtClean="0"/>
+              <a:t> ‘</a:t>
+            </a:r>
+            <a:r>
+              <a:rPr lang="en-GB" baseline="0" dirty="0" err="1" smtClean="0"/>
+              <a:t>hogere</a:t>
+            </a:r>
+            <a:r>
+              <a:rPr lang="en-GB" baseline="0" dirty="0" smtClean="0"/>
+              <a:t>’ </a:t>
+            </a:r>
+            <a:r>
+              <a:rPr lang="en-GB" baseline="0" dirty="0" err="1" smtClean="0"/>
+              <a:t>vraag</a:t>
+            </a:r>
+            <a:r>
+              <a:rPr lang="en-GB" baseline="0" dirty="0" smtClean="0"/>
+              <a:t> </a:t>
+            </a:r>
+            <a:r>
+              <a:rPr lang="en-GB" baseline="0" dirty="0" err="1" smtClean="0"/>
+              <a:t>boven</a:t>
+            </a:r>
+            <a:r>
+              <a:rPr lang="en-GB" baseline="0" dirty="0" smtClean="0"/>
+              <a:t>. De </a:t>
+            </a:r>
+            <a:r>
+              <a:rPr lang="en-GB" baseline="0" dirty="0" err="1" smtClean="0"/>
+              <a:t>onderzoeksvraag</a:t>
+            </a:r>
+            <a:r>
+              <a:rPr lang="en-GB" baseline="0" dirty="0" smtClean="0"/>
+              <a:t> </a:t>
+            </a:r>
+            <a:r>
+              <a:rPr lang="en-GB" baseline="0" dirty="0" err="1" smtClean="0"/>
+              <a:t>hoeft</a:t>
+            </a:r>
+            <a:r>
+              <a:rPr lang="en-GB" baseline="0" dirty="0" smtClean="0"/>
+              <a:t> </a:t>
+            </a:r>
+            <a:r>
+              <a:rPr lang="en-GB" baseline="0" dirty="0" err="1" smtClean="0"/>
+              <a:t>ook</a:t>
+            </a:r>
+            <a:r>
+              <a:rPr lang="en-GB" baseline="0" dirty="0" smtClean="0"/>
+              <a:t> </a:t>
+            </a:r>
+            <a:r>
+              <a:rPr lang="en-GB" baseline="0" dirty="0" err="1" smtClean="0"/>
+              <a:t>niet</a:t>
+            </a:r>
+            <a:r>
+              <a:rPr lang="en-GB" baseline="0" dirty="0" smtClean="0"/>
+              <a:t> in </a:t>
+            </a:r>
+            <a:r>
+              <a:rPr lang="en-GB" baseline="0" dirty="0" err="1" smtClean="0"/>
+              <a:t>één</a:t>
+            </a:r>
+            <a:r>
+              <a:rPr lang="en-GB" baseline="0" dirty="0" smtClean="0"/>
+              <a:t> </a:t>
+            </a:r>
+            <a:r>
+              <a:rPr lang="en-GB" baseline="0" dirty="0" err="1" smtClean="0"/>
+              <a:t>keer</a:t>
+            </a:r>
+            <a:r>
+              <a:rPr lang="en-GB" baseline="0" dirty="0" smtClean="0"/>
+              <a:t> </a:t>
+            </a:r>
+            <a:r>
+              <a:rPr lang="en-GB" baseline="0" dirty="0" err="1" smtClean="0"/>
+              <a:t>alles</a:t>
+            </a:r>
+            <a:r>
+              <a:rPr lang="en-GB" baseline="0" dirty="0" smtClean="0"/>
+              <a:t> </a:t>
+            </a:r>
+            <a:r>
+              <a:rPr lang="en-GB" baseline="0" dirty="0" err="1" smtClean="0"/>
+              <a:t>te</a:t>
+            </a:r>
+            <a:r>
+              <a:rPr lang="en-GB" baseline="0" dirty="0" smtClean="0"/>
+              <a:t> </a:t>
+            </a:r>
+            <a:r>
+              <a:rPr lang="en-GB" baseline="0" dirty="0" err="1" smtClean="0"/>
+              <a:t>zeggen</a:t>
+            </a:r>
+            <a:r>
+              <a:rPr lang="en-GB" baseline="0" dirty="0" smtClean="0"/>
+              <a:t>.</a:t>
+            </a:r>
             <a:endParaRPr lang="en-GB" dirty="0"/>
           </a:p>
         </p:txBody>
       </p:sp>
       <p:sp>
         <p:nvSpPr>
-          <p:cNvPr id="4" name="Slide Number Placeholder 3"/>
+          <p:cNvPr id="4" name="Tijdelijke aanduiding voor dianummer 3"/>
           <p:cNvSpPr>
             <a:spLocks noGrp="1"/>
           </p:cNvSpPr>
@@ -634,13 +818,18 @@
             <a:fld id="{9BBE7A90-5B18-44E6-896F-B56F6E25EE11}" type="slidenum">
               <a:rPr lang="en-GB" smtClean="0"/>
               <a:pPr/>
-              <a:t>8</a:t>
+              <a:t>2</a:t>
             </a:fld>
             <a:endParaRPr lang="en-GB"/>
           </a:p>
         </p:txBody>
       </p:sp>
     </p:spTree>
+    <p:extLst>
+      <p:ext uri="{BB962C8B-B14F-4D97-AF65-F5344CB8AC3E}">
+        <p14:creationId xmlns:p14="http://schemas.microsoft.com/office/powerpoint/2010/main" val="2842030594"/>
+      </p:ext>
+    </p:extLst>
   </p:cSld>
   <p:clrMapOvr>
     <a:masterClrMapping/>
@@ -694,36 +883,6 @@
           </a:bodyPr>
           <a:lstStyle/>
           <a:p>
-            <a:r>
-              <a:rPr lang="nl-NL" dirty="0" smtClean="0"/>
-              <a:t>Outgroup may be unnecessary.</a:t>
-            </a:r>
-            <a:r>
-              <a:rPr lang="nl-NL" baseline="0" dirty="0" smtClean="0"/>
-              <a:t> Constant clock rate used.</a:t>
-            </a:r>
-            <a:endParaRPr lang="nl-NL" dirty="0" smtClean="0"/>
-          </a:p>
-          <a:p>
-            <a:endParaRPr lang="nl-NL" dirty="0" smtClean="0"/>
-          </a:p>
-          <a:p>
-            <a:r>
-              <a:rPr lang="nl-NL" dirty="0" smtClean="0"/>
-              <a:t>TODO:</a:t>
-            </a:r>
-            <a:r>
-              <a:rPr lang="nl-NL" baseline="0" dirty="0" smtClean="0"/>
-              <a:t> Make species names better visible </a:t>
-            </a:r>
-          </a:p>
-          <a:p>
-            <a:r>
-              <a:rPr lang="nl-NL" baseline="0" dirty="0" smtClean="0"/>
-              <a:t>TODO: Add clearer title to pictures (Sampled tree 1 and 2)</a:t>
-            </a:r>
-          </a:p>
-          <a:p>
             <a:endParaRPr lang="en-GB" dirty="0"/>
           </a:p>
         </p:txBody>
@@ -746,13 +905,18 @@
             <a:fld id="{9BBE7A90-5B18-44E6-896F-B56F6E25EE11}" type="slidenum">
               <a:rPr lang="en-GB" smtClean="0"/>
               <a:pPr/>
-              <a:t>9</a:t>
+              <a:t>8</a:t>
             </a:fld>
             <a:endParaRPr lang="en-GB"/>
           </a:p>
         </p:txBody>
       </p:sp>
     </p:spTree>
+    <p:extLst>
+      <p:ext uri="{BB962C8B-B14F-4D97-AF65-F5344CB8AC3E}">
+        <p14:creationId xmlns:p14="http://schemas.microsoft.com/office/powerpoint/2010/main" val="61549203"/>
+      </p:ext>
+    </p:extLst>
   </p:cSld>
   <p:clrMapOvr>
     <a:masterClrMapping/>
@@ -808,18 +972,34 @@
           <a:p>
             <a:r>
               <a:rPr lang="nl-NL" dirty="0" smtClean="0"/>
+              <a:t>Outgroup may be unnecessary.</a:t>
+            </a:r>
+            <a:r>
+              <a:rPr lang="nl-NL" baseline="0" dirty="0" smtClean="0"/>
+              <a:t> Constant clock rate used.</a:t>
+            </a:r>
+            <a:endParaRPr lang="nl-NL" dirty="0" smtClean="0"/>
+          </a:p>
+          <a:p>
+            <a:endParaRPr lang="nl-NL" dirty="0" smtClean="0"/>
+          </a:p>
+          <a:p>
+            <a:r>
+              <a:rPr lang="nl-NL" dirty="0" smtClean="0"/>
               <a:t>TODO:</a:t>
             </a:r>
             <a:r>
               <a:rPr lang="nl-NL" baseline="0" dirty="0" smtClean="0"/>
-              <a:t> Clearer titles, show that these are 2 random draws sampled tree 1 </a:t>
+              <a:t> Make species names better visible </a:t>
             </a:r>
           </a:p>
           <a:p>
             <a:r>
               <a:rPr lang="nl-NL" baseline="0" dirty="0" smtClean="0"/>
-              <a:t>Q: Should we show the 2 drawn alignments from sampled tree 2 also? Not too much stuff happening in one dia?</a:t>
-            </a:r>
+              <a:t>TODO: Add clearer title to pictures (Sampled tree 1 and 2)</a:t>
+            </a:r>
+          </a:p>
+          <a:p>
             <a:endParaRPr lang="en-GB" dirty="0"/>
           </a:p>
         </p:txBody>
@@ -842,13 +1022,18 @@
             <a:fld id="{9BBE7A90-5B18-44E6-896F-B56F6E25EE11}" type="slidenum">
               <a:rPr lang="en-GB" smtClean="0"/>
               <a:pPr/>
-              <a:t>10</a:t>
+              <a:t>9</a:t>
             </a:fld>
             <a:endParaRPr lang="en-GB"/>
           </a:p>
         </p:txBody>
       </p:sp>
     </p:spTree>
+    <p:extLst>
+      <p:ext uri="{BB962C8B-B14F-4D97-AF65-F5344CB8AC3E}">
+        <p14:creationId xmlns:p14="http://schemas.microsoft.com/office/powerpoint/2010/main" val="3599947436"/>
+      </p:ext>
+    </p:extLst>
   </p:cSld>
   <p:clrMapOvr>
     <a:masterClrMapping/>
@@ -904,14 +1089,18 @@
           <a:p>
             <a:r>
               <a:rPr lang="nl-NL" dirty="0" smtClean="0"/>
-              <a:t>TODO: Find picture of posterior</a:t>
+              <a:t>TODO:</a:t>
             </a:r>
             <a:r>
               <a:rPr lang="nl-NL" baseline="0" dirty="0" smtClean="0"/>
-              <a:t> Toy example 4</a:t>
-            </a:r>
-          </a:p>
-          <a:p>
+              <a:t> Clearer titles, show that these are 2 random draws sampled tree 1 </a:t>
+            </a:r>
+          </a:p>
+          <a:p>
+            <a:r>
+              <a:rPr lang="nl-NL" baseline="0" dirty="0" smtClean="0"/>
+              <a:t>Q: Should we show the 2 drawn alignments from sampled tree 2 also? Not too much stuff happening in one dia?</a:t>
+            </a:r>
             <a:endParaRPr lang="en-GB" dirty="0"/>
           </a:p>
         </p:txBody>
@@ -934,13 +1123,18 @@
             <a:fld id="{9BBE7A90-5B18-44E6-896F-B56F6E25EE11}" type="slidenum">
               <a:rPr lang="en-GB" smtClean="0"/>
               <a:pPr/>
-              <a:t>11</a:t>
+              <a:t>10</a:t>
             </a:fld>
             <a:endParaRPr lang="en-GB"/>
           </a:p>
         </p:txBody>
       </p:sp>
     </p:spTree>
+    <p:extLst>
+      <p:ext uri="{BB962C8B-B14F-4D97-AF65-F5344CB8AC3E}">
+        <p14:creationId xmlns:p14="http://schemas.microsoft.com/office/powerpoint/2010/main" val="1400782642"/>
+      </p:ext>
+    </p:extLst>
   </p:cSld>
   <p:clrMapOvr>
     <a:masterClrMapping/>
@@ -996,8 +1190,14 @@
           <a:p>
             <a:r>
               <a:rPr lang="nl-NL" dirty="0" smtClean="0"/>
-              <a:t>TODO: Add legend</a:t>
-            </a:r>
+              <a:t>TODO: Find picture of posterior</a:t>
+            </a:r>
+            <a:r>
+              <a:rPr lang="nl-NL" baseline="0" dirty="0" smtClean="0"/>
+              <a:t> Toy example 4</a:t>
+            </a:r>
+          </a:p>
+          <a:p>
             <a:endParaRPr lang="en-GB" dirty="0"/>
           </a:p>
         </p:txBody>
@@ -1020,13 +1220,18 @@
             <a:fld id="{9BBE7A90-5B18-44E6-896F-B56F6E25EE11}" type="slidenum">
               <a:rPr lang="en-GB" smtClean="0"/>
               <a:pPr/>
-              <a:t>12</a:t>
+              <a:t>11</a:t>
             </a:fld>
             <a:endParaRPr lang="en-GB"/>
           </a:p>
         </p:txBody>
       </p:sp>
     </p:spTree>
+    <p:extLst>
+      <p:ext uri="{BB962C8B-B14F-4D97-AF65-F5344CB8AC3E}">
+        <p14:creationId xmlns:p14="http://schemas.microsoft.com/office/powerpoint/2010/main" val="2738485802"/>
+      </p:ext>
+    </p:extLst>
   </p:cSld>
   <p:clrMapOvr>
     <a:masterClrMapping/>
@@ -1082,6 +1287,97 @@
           <a:p>
             <a:r>
               <a:rPr lang="nl-NL" dirty="0" smtClean="0"/>
+              <a:t>TODO: Add legend</a:t>
+            </a:r>
+            <a:endParaRPr lang="en-GB" dirty="0"/>
+          </a:p>
+        </p:txBody>
+      </p:sp>
+      <p:sp>
+        <p:nvSpPr>
+          <p:cNvPr id="4" name="Slide Number Placeholder 3"/>
+          <p:cNvSpPr>
+            <a:spLocks noGrp="1"/>
+          </p:cNvSpPr>
+          <p:nvPr>
+            <p:ph type="sldNum" sz="quarter" idx="10"/>
+          </p:nvPr>
+        </p:nvSpPr>
+        <p:spPr/>
+        <p:txBody>
+          <a:bodyPr/>
+          <a:lstStyle/>
+          <a:p>
+            <a:fld id="{9BBE7A90-5B18-44E6-896F-B56F6E25EE11}" type="slidenum">
+              <a:rPr lang="en-GB" smtClean="0"/>
+              <a:pPr/>
+              <a:t>12</a:t>
+            </a:fld>
+            <a:endParaRPr lang="en-GB"/>
+          </a:p>
+        </p:txBody>
+      </p:sp>
+    </p:spTree>
+    <p:extLst>
+      <p:ext uri="{BB962C8B-B14F-4D97-AF65-F5344CB8AC3E}">
+        <p14:creationId xmlns:p14="http://schemas.microsoft.com/office/powerpoint/2010/main" val="825732437"/>
+      </p:ext>
+    </p:extLst>
+  </p:cSld>
+  <p:clrMapOvr>
+    <a:masterClrMapping/>
+  </p:clrMapOvr>
+</p:notes>
+</file>
+
+<file path=ppt/notesSlides/notesSlide8.xml><?xml version="1.0" encoding="utf-8"?>
+<p:notes xmlns:a="http://schemas.openxmlformats.org/drawingml/2006/main" xmlns:r="http://schemas.openxmlformats.org/officeDocument/2006/relationships" xmlns:p="http://schemas.openxmlformats.org/presentationml/2006/main">
+  <p:cSld>
+    <p:spTree>
+      <p:nvGrpSpPr>
+        <p:cNvPr id="1" name=""/>
+        <p:cNvGrpSpPr/>
+        <p:nvPr/>
+      </p:nvGrpSpPr>
+      <p:grpSpPr>
+        <a:xfrm>
+          <a:off x="0" y="0"/>
+          <a:ext cx="0" cy="0"/>
+          <a:chOff x="0" y="0"/>
+          <a:chExt cx="0" cy="0"/>
+        </a:xfrm>
+      </p:grpSpPr>
+      <p:sp>
+        <p:nvSpPr>
+          <p:cNvPr id="2" name="Slide Image Placeholder 1"/>
+          <p:cNvSpPr>
+            <a:spLocks noGrp="1" noRot="1" noChangeAspect="1"/>
+          </p:cNvSpPr>
+          <p:nvPr>
+            <p:ph type="sldImg"/>
+          </p:nvPr>
+        </p:nvSpPr>
+        <p:spPr/>
+      </p:sp>
+      <p:sp>
+        <p:nvSpPr>
+          <p:cNvPr id="3" name="Notes Placeholder 2"/>
+          <p:cNvSpPr>
+            <a:spLocks noGrp="1"/>
+          </p:cNvSpPr>
+          <p:nvPr>
+            <p:ph type="body" idx="1"/>
+          </p:nvPr>
+        </p:nvSpPr>
+        <p:spPr/>
+        <p:txBody>
+          <a:bodyPr>
+            <a:normAutofit/>
+          </a:bodyPr>
+          <a:lstStyle/>
+          <a:p>
+            <a:r>
+              <a:rPr lang="nl-NL" dirty="0" smtClean="0"/>
               <a:t>POSSIBLE QUESTIONS?:</a:t>
             </a:r>
           </a:p>
@@ -1131,6 +1427,11 @@
         </p:txBody>
       </p:sp>
     </p:spTree>
+    <p:extLst>
+      <p:ext uri="{BB962C8B-B14F-4D97-AF65-F5344CB8AC3E}">
+        <p14:creationId xmlns:p14="http://schemas.microsoft.com/office/powerpoint/2010/main" val="4012545158"/>
+      </p:ext>
+    </p:extLst>
   </p:cSld>
   <p:clrMapOvr>
     <a:masterClrMapping/>
@@ -1320,7 +1621,7 @@
             <a:fld id="{1D8BD707-D9CF-40AE-B4C6-C98DA3205C09}" type="datetimeFigureOut">
               <a:rPr lang="en-US" smtClean="0"/>
               <a:pPr/>
-              <a:t>5/17/2016</a:t>
+              <a:t>5/18/2016</a:t>
             </a:fld>
             <a:endParaRPr lang="en-US"/>
           </a:p>
@@ -1363,7 +1664,7 @@
             <a:fld id="{B6F15528-21DE-4FAA-801E-634DDDAF4B2B}" type="slidenum">
               <a:rPr lang="en-US" smtClean="0"/>
               <a:pPr/>
-              <a:t>‹#›</a:t>
+              <a:t>‹nr.›</a:t>
             </a:fld>
             <a:endParaRPr lang="en-US"/>
           </a:p>
@@ -1487,7 +1788,7 @@
             <a:fld id="{1D8BD707-D9CF-40AE-B4C6-C98DA3205C09}" type="datetimeFigureOut">
               <a:rPr lang="en-US" smtClean="0"/>
               <a:pPr/>
-              <a:t>5/17/2016</a:t>
+              <a:t>5/18/2016</a:t>
             </a:fld>
             <a:endParaRPr lang="en-US"/>
           </a:p>
@@ -1530,7 +1831,7 @@
             <a:fld id="{B6F15528-21DE-4FAA-801E-634DDDAF4B2B}" type="slidenum">
               <a:rPr lang="en-US" smtClean="0"/>
               <a:pPr/>
-              <a:t>‹#›</a:t>
+              <a:t>‹nr.›</a:t>
             </a:fld>
             <a:endParaRPr lang="en-US"/>
           </a:p>
@@ -1664,7 +1965,7 @@
             <a:fld id="{1D8BD707-D9CF-40AE-B4C6-C98DA3205C09}" type="datetimeFigureOut">
               <a:rPr lang="en-US" smtClean="0"/>
               <a:pPr/>
-              <a:t>5/17/2016</a:t>
+              <a:t>5/18/2016</a:t>
             </a:fld>
             <a:endParaRPr lang="en-US"/>
           </a:p>
@@ -1707,7 +2008,7 @@
             <a:fld id="{B6F15528-21DE-4FAA-801E-634DDDAF4B2B}" type="slidenum">
               <a:rPr lang="en-US" smtClean="0"/>
               <a:pPr/>
-              <a:t>‹#›</a:t>
+              <a:t>‹nr.›</a:t>
             </a:fld>
             <a:endParaRPr lang="en-US"/>
           </a:p>
@@ -1831,7 +2132,7 @@
             <a:fld id="{1D8BD707-D9CF-40AE-B4C6-C98DA3205C09}" type="datetimeFigureOut">
               <a:rPr lang="en-US" smtClean="0"/>
               <a:pPr/>
-              <a:t>5/17/2016</a:t>
+              <a:t>5/18/2016</a:t>
             </a:fld>
             <a:endParaRPr lang="en-US"/>
           </a:p>
@@ -1874,7 +2175,7 @@
             <a:fld id="{B6F15528-21DE-4FAA-801E-634DDDAF4B2B}" type="slidenum">
               <a:rPr lang="en-US" smtClean="0"/>
               <a:pPr/>
-              <a:t>‹#›</a:t>
+              <a:t>‹nr.›</a:t>
             </a:fld>
             <a:endParaRPr lang="en-US"/>
           </a:p>
@@ -2074,7 +2375,7 @@
             <a:fld id="{1D8BD707-D9CF-40AE-B4C6-C98DA3205C09}" type="datetimeFigureOut">
               <a:rPr lang="en-US" smtClean="0"/>
               <a:pPr/>
-              <a:t>5/17/2016</a:t>
+              <a:t>5/18/2016</a:t>
             </a:fld>
             <a:endParaRPr lang="en-US"/>
           </a:p>
@@ -2117,7 +2418,7 @@
             <a:fld id="{B6F15528-21DE-4FAA-801E-634DDDAF4B2B}" type="slidenum">
               <a:rPr lang="en-US" smtClean="0"/>
               <a:pPr/>
-              <a:t>‹#›</a:t>
+              <a:t>‹nr.›</a:t>
             </a:fld>
             <a:endParaRPr lang="en-US"/>
           </a:p>
@@ -2359,7 +2660,7 @@
             <a:fld id="{1D8BD707-D9CF-40AE-B4C6-C98DA3205C09}" type="datetimeFigureOut">
               <a:rPr lang="en-US" smtClean="0"/>
               <a:pPr/>
-              <a:t>5/17/2016</a:t>
+              <a:t>5/18/2016</a:t>
             </a:fld>
             <a:endParaRPr lang="en-US"/>
           </a:p>
@@ -2402,7 +2703,7 @@
             <a:fld id="{B6F15528-21DE-4FAA-801E-634DDDAF4B2B}" type="slidenum">
               <a:rPr lang="en-US" smtClean="0"/>
               <a:pPr/>
-              <a:t>‹#›</a:t>
+              <a:t>‹nr.›</a:t>
             </a:fld>
             <a:endParaRPr lang="en-US"/>
           </a:p>
@@ -2778,7 +3079,7 @@
             <a:fld id="{1D8BD707-D9CF-40AE-B4C6-C98DA3205C09}" type="datetimeFigureOut">
               <a:rPr lang="en-US" smtClean="0"/>
               <a:pPr/>
-              <a:t>5/17/2016</a:t>
+              <a:t>5/18/2016</a:t>
             </a:fld>
             <a:endParaRPr lang="en-US"/>
           </a:p>
@@ -2821,7 +3122,7 @@
             <a:fld id="{B6F15528-21DE-4FAA-801E-634DDDAF4B2B}" type="slidenum">
               <a:rPr lang="en-US" smtClean="0"/>
               <a:pPr/>
-              <a:t>‹#›</a:t>
+              <a:t>‹nr.›</a:t>
             </a:fld>
             <a:endParaRPr lang="en-US"/>
           </a:p>
@@ -2893,7 +3194,7 @@
             <a:fld id="{1D8BD707-D9CF-40AE-B4C6-C98DA3205C09}" type="datetimeFigureOut">
               <a:rPr lang="en-US" smtClean="0"/>
               <a:pPr/>
-              <a:t>5/17/2016</a:t>
+              <a:t>5/18/2016</a:t>
             </a:fld>
             <a:endParaRPr lang="en-US"/>
           </a:p>
@@ -2936,7 +3237,7 @@
             <a:fld id="{B6F15528-21DE-4FAA-801E-634DDDAF4B2B}" type="slidenum">
               <a:rPr lang="en-US" smtClean="0"/>
               <a:pPr/>
-              <a:t>‹#›</a:t>
+              <a:t>‹nr.›</a:t>
             </a:fld>
             <a:endParaRPr lang="en-US"/>
           </a:p>
@@ -2985,7 +3286,7 @@
             <a:fld id="{1D8BD707-D9CF-40AE-B4C6-C98DA3205C09}" type="datetimeFigureOut">
               <a:rPr lang="en-US" smtClean="0"/>
               <a:pPr/>
-              <a:t>5/17/2016</a:t>
+              <a:t>5/18/2016</a:t>
             </a:fld>
             <a:endParaRPr lang="en-US"/>
           </a:p>
@@ -3028,7 +3329,7 @@
             <a:fld id="{B6F15528-21DE-4FAA-801E-634DDDAF4B2B}" type="slidenum">
               <a:rPr lang="en-US" smtClean="0"/>
               <a:pPr/>
-              <a:t>‹#›</a:t>
+              <a:t>‹nr.›</a:t>
             </a:fld>
             <a:endParaRPr lang="en-US"/>
           </a:p>
@@ -3259,7 +3560,7 @@
             <a:fld id="{1D8BD707-D9CF-40AE-B4C6-C98DA3205C09}" type="datetimeFigureOut">
               <a:rPr lang="en-US" smtClean="0"/>
               <a:pPr/>
-              <a:t>5/17/2016</a:t>
+              <a:t>5/18/2016</a:t>
             </a:fld>
             <a:endParaRPr lang="en-US"/>
           </a:p>
@@ -3302,7 +3603,7 @@
             <a:fld id="{B6F15528-21DE-4FAA-801E-634DDDAF4B2B}" type="slidenum">
               <a:rPr lang="en-US" smtClean="0"/>
               <a:pPr/>
-              <a:t>‹#›</a:t>
+              <a:t>‹nr.›</a:t>
             </a:fld>
             <a:endParaRPr lang="en-US"/>
           </a:p>
@@ -3509,7 +3810,7 @@
             <a:fld id="{1D8BD707-D9CF-40AE-B4C6-C98DA3205C09}" type="datetimeFigureOut">
               <a:rPr lang="en-US" smtClean="0"/>
               <a:pPr/>
-              <a:t>5/17/2016</a:t>
+              <a:t>5/18/2016</a:t>
             </a:fld>
             <a:endParaRPr lang="en-US"/>
           </a:p>
@@ -3552,7 +3853,7 @@
             <a:fld id="{B6F15528-21DE-4FAA-801E-634DDDAF4B2B}" type="slidenum">
               <a:rPr lang="en-US" smtClean="0"/>
               <a:pPr/>
-              <a:t>‹#›</a:t>
+              <a:t>‹nr.›</a:t>
             </a:fld>
             <a:endParaRPr lang="en-US"/>
           </a:p>
@@ -3719,7 +4020,7 @@
             <a:fld id="{1D8BD707-D9CF-40AE-B4C6-C98DA3205C09}" type="datetimeFigureOut">
               <a:rPr lang="en-US" smtClean="0"/>
               <a:pPr/>
-              <a:t>5/17/2016</a:t>
+              <a:t>5/18/2016</a:t>
             </a:fld>
             <a:endParaRPr lang="en-US"/>
           </a:p>
@@ -3798,7 +4099,7 @@
             <a:fld id="{B6F15528-21DE-4FAA-801E-634DDDAF4B2B}" type="slidenum">
               <a:rPr lang="en-US" smtClean="0"/>
               <a:pPr/>
-              <a:t>‹#›</a:t>
+              <a:t>‹nr.›</a:t>
             </a:fld>
             <a:endParaRPr lang="en-US"/>
           </a:p>
@@ -4203,6 +4504,13 @@
   <p:clrMapOvr>
     <a:masterClrMapping/>
   </p:clrMapOvr>
+  <p:timing>
+    <p:tnLst>
+      <p:par>
+        <p:cTn id="1" dur="indefinite" restart="never" nodeType="tmRoot"/>
+      </p:par>
+    </p:tnLst>
+  </p:timing>
 </p:sld>
 </file>
 
@@ -4562,6 +4870,13 @@
   <p:clrMapOvr>
     <a:masterClrMapping/>
   </p:clrMapOvr>
+  <p:timing>
+    <p:tnLst>
+      <p:par>
+        <p:cTn id="1" dur="indefinite" restart="never" nodeType="tmRoot"/>
+      </p:par>
+    </p:tnLst>
+  </p:timing>
 </p:sld>
 </file>
 
@@ -4795,6 +5110,13 @@
   <p:clrMapOvr>
     <a:masterClrMapping/>
   </p:clrMapOvr>
+  <p:timing>
+    <p:tnLst>
+      <p:par>
+        <p:cTn id="1" dur="indefinite" restart="never" nodeType="tmRoot"/>
+      </p:par>
+    </p:tnLst>
+  </p:timing>
 </p:sld>
 </file>
 
@@ -4974,6 +5296,13 @@
   <p:clrMapOvr>
     <a:masterClrMapping/>
   </p:clrMapOvr>
+  <p:timing>
+    <p:tnLst>
+      <p:par>
+        <p:cTn id="1" dur="indefinite" restart="never" nodeType="tmRoot"/>
+      </p:par>
+    </p:tnLst>
+  </p:timing>
 </p:sld>
 </file>
 
@@ -5228,6 +5557,13 @@
   <p:clrMapOvr>
     <a:masterClrMapping/>
   </p:clrMapOvr>
+  <p:timing>
+    <p:tnLst>
+      <p:par>
+        <p:cTn id="1" dur="indefinite" restart="never" nodeType="tmRoot"/>
+      </p:par>
+    </p:tnLst>
+  </p:timing>
 </p:sld>
 </file>
 
@@ -5353,6 +5689,13 @@
   <p:clrMapOvr>
     <a:masterClrMapping/>
   </p:clrMapOvr>
+  <p:timing>
+    <p:tnLst>
+      <p:par>
+        <p:cTn id="1" dur="indefinite" restart="never" nodeType="tmRoot"/>
+      </p:par>
+    </p:tnLst>
+  </p:timing>
 </p:sld>
 </file>
 
@@ -5434,6 +5777,13 @@
   <p:clrMapOvr>
     <a:masterClrMapping/>
   </p:clrMapOvr>
+  <p:timing>
+    <p:tnLst>
+      <p:par>
+        <p:cTn id="1" dur="indefinite" restart="never" nodeType="tmRoot"/>
+      </p:par>
+    </p:tnLst>
+  </p:timing>
 </p:sld>
 </file>
 
@@ -5513,6 +5863,13 @@
   <p:clrMapOvr>
     <a:masterClrMapping/>
   </p:clrMapOvr>
+  <p:timing>
+    <p:tnLst>
+      <p:par>
+        <p:cTn id="1" dur="indefinite" restart="never" nodeType="tmRoot"/>
+      </p:par>
+    </p:tnLst>
+  </p:timing>
 </p:sld>
 </file>
 
@@ -5593,6 +5950,13 @@
   <p:clrMapOvr>
     <a:masterClrMapping/>
   </p:clrMapOvr>
+  <p:timing>
+    <p:tnLst>
+      <p:par>
+        <p:cTn id="1" dur="indefinite" restart="never" nodeType="tmRoot"/>
+      </p:par>
+    </p:tnLst>
+  </p:timing>
 </p:sld>
 </file>
 
@@ -5641,6 +6005,13 @@
   <p:clrMapOvr>
     <a:masterClrMapping/>
   </p:clrMapOvr>
+  <p:timing>
+    <p:tnLst>
+      <p:par>
+        <p:cTn id="1" dur="indefinite" restart="never" nodeType="tmRoot"/>
+      </p:par>
+    </p:tnLst>
+  </p:timing>
 </p:sld>
 </file>
 
@@ -5737,6 +6108,13 @@
   <p:clrMapOvr>
     <a:masterClrMapping/>
   </p:clrMapOvr>
+  <p:timing>
+    <p:tnLst>
+      <p:par>
+        <p:cTn id="1" dur="indefinite" restart="never" nodeType="tmRoot"/>
+      </p:par>
+    </p:tnLst>
+  </p:timing>
 </p:sld>
 </file>
 
@@ -5878,6 +6256,13 @@
   <p:clrMapOvr>
     <a:masterClrMapping/>
   </p:clrMapOvr>
+  <p:timing>
+    <p:tnLst>
+      <p:par>
+        <p:cTn id="1" dur="indefinite" restart="never" nodeType="tmRoot"/>
+      </p:par>
+    </p:tnLst>
+  </p:timing>
 </p:sld>
 </file>
 
@@ -6329,6 +6714,13 @@
   <p:clrMapOvr>
     <a:masterClrMapping/>
   </p:clrMapOvr>
+  <p:timing>
+    <p:tnLst>
+      <p:par>
+        <p:cTn id="1" dur="indefinite" restart="never" nodeType="tmRoot"/>
+      </p:par>
+    </p:tnLst>
+  </p:timing>
 </p:sld>
 </file>
 
@@ -6466,6 +6858,13 @@
   <p:clrMapOvr>
     <a:masterClrMapping/>
   </p:clrMapOvr>
+  <p:timing>
+    <p:tnLst>
+      <p:par>
+        <p:cTn id="1" dur="indefinite" restart="never" nodeType="tmRoot"/>
+      </p:par>
+    </p:tnLst>
+  </p:timing>
 </p:sld>
 </file>
 
@@ -6697,6 +7096,13 @@
   <p:clrMapOvr>
     <a:masterClrMapping/>
   </p:clrMapOvr>
+  <p:timing>
+    <p:tnLst>
+      <p:par>
+        <p:cTn id="1" dur="indefinite" restart="never" nodeType="tmRoot"/>
+      </p:par>
+    </p:tnLst>
+  </p:timing>
 </p:sld>
 </file>
 
@@ -6832,6 +7238,13 @@
   <p:clrMapOvr>
     <a:masterClrMapping/>
   </p:clrMapOvr>
+  <p:timing>
+    <p:tnLst>
+      <p:par>
+        <p:cTn id="1" dur="indefinite" restart="never" nodeType="tmRoot"/>
+      </p:par>
+    </p:tnLst>
+  </p:timing>
 </p:sld>
 </file>
 
@@ -6956,6 +7369,13 @@
   <p:clrMapOvr>
     <a:masterClrMapping/>
   </p:clrMapOvr>
+  <p:timing>
+    <p:tnLst>
+      <p:par>
+        <p:cTn id="1" dur="indefinite" restart="never" nodeType="tmRoot"/>
+      </p:par>
+    </p:tnLst>
+  </p:timing>
 </p:sld>
 </file>
 
@@ -7245,6 +7665,13 @@
   <p:clrMapOvr>
     <a:masterClrMapping/>
   </p:clrMapOvr>
+  <p:timing>
+    <p:tnLst>
+      <p:par>
+        <p:cTn id="1" dur="indefinite" restart="never" nodeType="tmRoot"/>
+      </p:par>
+    </p:tnLst>
+  </p:timing>
 </p:sld>
 </file>
 

</xml_diff>